<commit_message>
Updates to BMCC Class notes week 2 class 2
</commit_message>
<xml_diff>
--- a/Lecture notes/week1_overview/Introduction to Web design.pptx
+++ b/Lecture notes/week1_overview/Introduction to Web design.pptx
@@ -31,6 +31,7 @@
     <p:sldId id="285" r:id="rId25"/>
     <p:sldId id="284" r:id="rId26"/>
     <p:sldId id="286" r:id="rId27"/>
+    <p:sldId id="310" r:id="rId28"/>
   </p:sldIdLst>
   <p:sldSz cx="12192000" cy="6858000"/>
   <p:notesSz cx="6858000" cy="9144000"/>
@@ -131,7 +132,7 @@
   </p:defaultTextStyle>
   <p:extLst>
     <p:ext uri="{EFAFB233-063F-42B5-8137-9DF3F51BA10A}">
-      <p15:sldGuideLst xmlns:p15="http://schemas.microsoft.com/office/powerpoint/2012/main" xmlns=""/>
+      <p15:sldGuideLst xmlns="" xmlns:p15="http://schemas.microsoft.com/office/powerpoint/2012/main"/>
     </p:ext>
   </p:extLst>
 </p:presentation>
@@ -383,7 +384,7 @@
             <a:fld id="{B61BEF0D-F0BB-DE4B-95CE-6DB70DBA9567}" type="datetimeFigureOut">
               <a:rPr lang="en-US" dirty="0"/>
               <a:pPr/>
-              <a:t>1/30/17</a:t>
+              <a:t>2/6/17</a:t>
             </a:fld>
             <a:endParaRPr lang="en-US" dirty="0"/>
           </a:p>
@@ -642,7 +643,7 @@
             <a:fld id="{B61BEF0D-F0BB-DE4B-95CE-6DB70DBA9567}" type="datetimeFigureOut">
               <a:rPr lang="en-US" dirty="0"/>
               <a:pPr/>
-              <a:t>1/30/17</a:t>
+              <a:t>2/6/17</a:t>
             </a:fld>
             <a:endParaRPr lang="en-US" dirty="0"/>
           </a:p>
@@ -874,7 +875,7 @@
             <a:fld id="{B61BEF0D-F0BB-DE4B-95CE-6DB70DBA9567}" type="datetimeFigureOut">
               <a:rPr lang="en-US" dirty="0"/>
               <a:pPr/>
-              <a:t>1/30/17</a:t>
+              <a:t>2/6/17</a:t>
             </a:fld>
             <a:endParaRPr lang="en-US" dirty="0"/>
           </a:p>
@@ -1111,7 +1112,7 @@
             <a:fld id="{B61BEF0D-F0BB-DE4B-95CE-6DB70DBA9567}" type="datetimeFigureOut">
               <a:rPr lang="en-US" dirty="0"/>
               <a:pPr/>
-              <a:t>1/30/17</a:t>
+              <a:t>2/6/17</a:t>
             </a:fld>
             <a:endParaRPr lang="en-US" dirty="0"/>
           </a:p>
@@ -1415,7 +1416,7 @@
             <a:fld id="{B61BEF0D-F0BB-DE4B-95CE-6DB70DBA9567}" type="datetimeFigureOut">
               <a:rPr lang="en-US" dirty="0"/>
               <a:pPr/>
-              <a:t>1/30/17</a:t>
+              <a:t>2/6/17</a:t>
             </a:fld>
             <a:endParaRPr lang="en-US" dirty="0"/>
           </a:p>
@@ -1714,7 +1715,7 @@
             <a:fld id="{B61BEF0D-F0BB-DE4B-95CE-6DB70DBA9567}" type="datetimeFigureOut">
               <a:rPr lang="en-US" dirty="0"/>
               <a:pPr/>
-              <a:t>1/30/17</a:t>
+              <a:t>2/6/17</a:t>
             </a:fld>
             <a:endParaRPr lang="en-US" dirty="0"/>
           </a:p>
@@ -2133,7 +2134,7 @@
             <a:fld id="{B61BEF0D-F0BB-DE4B-95CE-6DB70DBA9567}" type="datetimeFigureOut">
               <a:rPr lang="en-US" dirty="0"/>
               <a:pPr/>
-              <a:t>1/30/17</a:t>
+              <a:t>2/6/17</a:t>
             </a:fld>
             <a:endParaRPr lang="en-US" dirty="0"/>
           </a:p>
@@ -2292,7 +2293,7 @@
             <a:fld id="{B61BEF0D-F0BB-DE4B-95CE-6DB70DBA9567}" type="datetimeFigureOut">
               <a:rPr lang="en-US" dirty="0"/>
               <a:pPr/>
-              <a:t>1/30/17</a:t>
+              <a:t>2/6/17</a:t>
             </a:fld>
             <a:endParaRPr lang="en-US" dirty="0"/>
           </a:p>
@@ -2384,7 +2385,7 @@
             <a:fld id="{B61BEF0D-F0BB-DE4B-95CE-6DB70DBA9567}" type="datetimeFigureOut">
               <a:rPr lang="en-US" dirty="0"/>
               <a:pPr/>
-              <a:t>1/30/17</a:t>
+              <a:t>2/6/17</a:t>
             </a:fld>
             <a:endParaRPr lang="en-US" dirty="0"/>
           </a:p>
@@ -2759,7 +2760,7 @@
             <a:fld id="{B61BEF0D-F0BB-DE4B-95CE-6DB70DBA9567}" type="datetimeFigureOut">
               <a:rPr lang="en-US" dirty="0"/>
               <a:pPr/>
-              <a:t>1/30/17</a:t>
+              <a:t>2/6/17</a:t>
             </a:fld>
             <a:endParaRPr lang="en-US" dirty="0"/>
           </a:p>
@@ -3045,7 +3046,7 @@
             <a:fld id="{B61BEF0D-F0BB-DE4B-95CE-6DB70DBA9567}" type="datetimeFigureOut">
               <a:rPr lang="en-US" dirty="0"/>
               <a:pPr/>
-              <a:t>1/30/17</a:t>
+              <a:t>2/6/17</a:t>
             </a:fld>
             <a:endParaRPr lang="en-US" dirty="0"/>
           </a:p>
@@ -3253,7 +3254,7 @@
             <a:fld id="{B61BEF0D-F0BB-DE4B-95CE-6DB70DBA9567}" type="datetimeFigureOut">
               <a:rPr lang="en-US" dirty="0"/>
               <a:pPr/>
-              <a:t>1/30/17</a:t>
+              <a:t>2/6/17</a:t>
             </a:fld>
             <a:endParaRPr lang="en-US" dirty="0"/>
           </a:p>
@@ -4391,11 +4392,7 @@
           <a:p>
             <a:r>
               <a:rPr lang="en-US" dirty="0" smtClean="0"/>
-              <a:t>Inheritance: Why is the text All </a:t>
-            </a:r>
-            <a:r>
-              <a:rPr lang="en-US" dirty="0" smtClean="0"/>
-              <a:t>RED?</a:t>
+              <a:t>Inheritance: Why is the text All RED?</a:t>
             </a:r>
             <a:endParaRPr lang="en-US" dirty="0"/>
           </a:p>
@@ -4767,13 +4764,8 @@
             <a:pPr lvl="1"/>
             <a:r>
               <a:rPr lang="en-US" sz="2000" dirty="0" smtClean="0"/>
-              <a:t>Ids are the most </a:t>
-            </a:r>
-            <a:r>
-              <a:rPr lang="en-US" sz="2000" dirty="0" smtClean="0"/>
-              <a:t>specific</a:t>
-            </a:r>
-            <a:endParaRPr lang="en-US" sz="2000" dirty="0" smtClean="0"/>
+              <a:t>Ids are the most specific</a:t>
+            </a:r>
           </a:p>
           <a:p>
             <a:pPr lvl="1"/>
@@ -4851,7 +4843,19 @@
           <a:p>
             <a:r>
               <a:rPr lang="en-US" dirty="0" smtClean="0"/>
-              <a:t>Display; Block, Inline, None</a:t>
+              <a:t>Display</a:t>
+            </a:r>
+            <a:r>
+              <a:rPr lang="en-US" dirty="0" smtClean="0"/>
+              <a:t>: </a:t>
+            </a:r>
+            <a:r>
+              <a:rPr lang="en-US" dirty="0" smtClean="0"/>
+              <a:t>Block</a:t>
+            </a:r>
+            <a:r>
+              <a:rPr lang="en-US" dirty="0" smtClean="0"/>
+              <a:t>, Inline, None</a:t>
             </a:r>
             <a:endParaRPr lang="en-US" dirty="0"/>
           </a:p>
@@ -7540,41 +7544,74 @@
             <p:ph idx="1"/>
           </p:nvPr>
         </p:nvSpPr>
-        <p:spPr/>
-        <p:txBody>
-          <a:bodyPr/>
+        <p:spPr>
+          <a:xfrm>
+            <a:off x="581192" y="2581827"/>
+            <a:ext cx="11029615" cy="2540192"/>
+          </a:xfrm>
+        </p:spPr>
+        <p:txBody>
+          <a:bodyPr>
+            <a:normAutofit fontScale="85000" lnSpcReduction="20000"/>
+          </a:bodyPr>
           <a:lstStyle/>
           <a:p>
+            <a:endParaRPr lang="en-US" sz="2000" dirty="0"/>
+          </a:p>
+          <a:p>
             <a:r>
               <a:rPr lang="en-US" sz="2000" dirty="0" smtClean="0"/>
+              <a:t>All </a:t>
+            </a:r>
+            <a:r>
+              <a:rPr lang="en-US" sz="2000" dirty="0"/>
+              <a:t>containers on the page have their widths defined in </a:t>
+            </a:r>
+            <a:r>
+              <a:rPr lang="en-US" sz="2000" dirty="0" err="1"/>
+              <a:t>percents</a:t>
+            </a:r>
+            <a:r>
+              <a:rPr lang="en-US" sz="2000" dirty="0"/>
+              <a:t> – meaning that they are completely based on the viewport rather than the initial containing block. A </a:t>
+            </a:r>
+            <a:r>
+              <a:rPr lang="en-US" sz="2000" b="1" dirty="0"/>
+              <a:t>liquid layout</a:t>
+            </a:r>
+            <a:r>
+              <a:rPr lang="en-US" sz="2000" dirty="0"/>
+              <a:t> will move in and out when you resize your browser </a:t>
+            </a:r>
+            <a:r>
+              <a:rPr lang="en-US" sz="2000" dirty="0" smtClean="0"/>
+              <a:t>window</a:t>
+            </a:r>
+          </a:p>
+          <a:p>
+            <a:r>
+              <a:rPr lang="en-US" sz="2000" dirty="0"/>
               <a:t>Layout changes according to the width of browser resolution, and resolution of screen</a:t>
             </a:r>
           </a:p>
           <a:p>
             <a:r>
+              <a:rPr lang="en-US" sz="2000" dirty="0"/>
+              <a:t>Most container elements have percentage widths</a:t>
+            </a:r>
+          </a:p>
+          <a:p>
+            <a:pPr marL="0" indent="0">
+              <a:buNone/>
+            </a:pPr>
+            <a:r>
               <a:rPr lang="en-US" sz="2000" dirty="0" smtClean="0"/>
-              <a:t>Most container elements have percentage widths</a:t>
-            </a:r>
-          </a:p>
-          <a:p>
-            <a:endParaRPr lang="en-US" sz="2000" dirty="0"/>
-          </a:p>
-          <a:p>
-            <a:pPr marL="0" indent="0">
-              <a:buNone/>
-            </a:pPr>
+              <a:t>Example</a:t>
+            </a:r>
             <a:r>
               <a:rPr lang="en-US" sz="2000" dirty="0" smtClean="0"/>
-              <a:t>Example: </a:t>
-            </a:r>
-          </a:p>
-          <a:p>
-            <a:pPr marL="0" indent="0">
-              <a:buNone/>
-            </a:pPr>
-            <a:endParaRPr lang="de-DE" sz="2000" dirty="0" smtClean="0">
-              <a:hlinkClick r:id="rId2"/>
-            </a:endParaRPr>
+              <a:t>: </a:t>
+            </a:r>
           </a:p>
           <a:p>
             <a:pPr marL="0" indent="0">
@@ -7812,6 +7849,100 @@
       </p:par>
     </p:tnLst>
   </p:timing>
+</p:sld>
+</file>
+
+<file path=ppt/slides/slide27.xml><?xml version="1.0" encoding="utf-8"?>
+<p:sld xmlns:a="http://schemas.openxmlformats.org/drawingml/2006/main" xmlns:r="http://schemas.openxmlformats.org/officeDocument/2006/relationships" xmlns:p="http://schemas.openxmlformats.org/presentationml/2006/main">
+  <p:cSld>
+    <p:spTree>
+      <p:nvGrpSpPr>
+        <p:cNvPr id="1" name=""/>
+        <p:cNvGrpSpPr/>
+        <p:nvPr/>
+      </p:nvGrpSpPr>
+      <p:grpSpPr>
+        <a:xfrm>
+          <a:off x="0" y="0"/>
+          <a:ext cx="0" cy="0"/>
+          <a:chOff x="0" y="0"/>
+          <a:chExt cx="0" cy="0"/>
+        </a:xfrm>
+      </p:grpSpPr>
+      <p:sp>
+        <p:nvSpPr>
+          <p:cNvPr id="2" name="Title 1"/>
+          <p:cNvSpPr>
+            <a:spLocks noGrp="1"/>
+          </p:cNvSpPr>
+          <p:nvPr>
+            <p:ph type="title"/>
+          </p:nvPr>
+        </p:nvSpPr>
+        <p:spPr/>
+        <p:txBody>
+          <a:bodyPr/>
+          <a:lstStyle/>
+          <a:p>
+            <a:r>
+              <a:rPr lang="en-US" dirty="0" smtClean="0"/>
+              <a:t>Mixture of Liquid and </a:t>
+            </a:r>
+            <a:r>
+              <a:rPr lang="en-US" smtClean="0"/>
+              <a:t>Fixed Layouts</a:t>
+            </a:r>
+            <a:endParaRPr lang="en-US" dirty="0"/>
+          </a:p>
+        </p:txBody>
+      </p:sp>
+      <p:sp>
+        <p:nvSpPr>
+          <p:cNvPr id="3" name="Content Placeholder 2"/>
+          <p:cNvSpPr>
+            <a:spLocks noGrp="1"/>
+          </p:cNvSpPr>
+          <p:nvPr>
+            <p:ph idx="1"/>
+          </p:nvPr>
+        </p:nvSpPr>
+        <p:spPr/>
+        <p:txBody>
+          <a:bodyPr/>
+          <a:lstStyle/>
+          <a:p>
+            <a:r>
+              <a:rPr lang="en-US" dirty="0" smtClean="0"/>
+              <a:t>A liquid layout in which one or more of the containers on the page have fixed widths.</a:t>
+            </a:r>
+          </a:p>
+          <a:p>
+            <a:endParaRPr lang="en-US" dirty="0"/>
+          </a:p>
+          <a:p>
+            <a:endParaRPr lang="en-US" dirty="0" smtClean="0"/>
+          </a:p>
+          <a:p>
+            <a:endParaRPr lang="en-US" dirty="0"/>
+          </a:p>
+          <a:p>
+            <a:endParaRPr lang="en-US" dirty="0" smtClean="0"/>
+          </a:p>
+          <a:p>
+            <a:endParaRPr lang="en-US" dirty="0"/>
+          </a:p>
+        </p:txBody>
+      </p:sp>
+    </p:spTree>
+    <p:extLst>
+      <p:ext uri="{BB962C8B-B14F-4D97-AF65-F5344CB8AC3E}">
+        <p14:creationId xmlns:p14="http://schemas.microsoft.com/office/powerpoint/2010/main" val="2530138039"/>
+      </p:ext>
+    </p:extLst>
+  </p:cSld>
+  <p:clrMapOvr>
+    <a:masterClrMapping/>
+  </p:clrMapOvr>
 </p:sld>
 </file>
 
@@ -9309,7 +9440,7 @@
   <a:extraClrSchemeLst/>
   <a:extLst>
     <a:ext uri="{05A4C25C-085E-4340-85A3-A5531E510DB2}">
-      <thm15:themeFamily xmlns:thm15="http://schemas.microsoft.com/office/thememl/2012/main" xmlns="" name="Dividend" id="{9697A71B-4AB7-4A1A-BD5B-BB2D22835B57}" vid="{C21699FF-00E4-43C8-BBCC-D7E5536C3717}"/>
+      <thm15:themeFamily xmlns="" xmlns:thm15="http://schemas.microsoft.com/office/thememl/2012/main" name="Dividend" id="{9697A71B-4AB7-4A1A-BD5B-BB2D22835B57}" vid="{C21699FF-00E4-43C8-BBCC-D7E5536C3717}"/>
     </a:ext>
   </a:extLst>
 </a:theme>

</xml_diff>